<commit_message>
Fix class 4 timeline
</commit_message>
<xml_diff>
--- a/Class 4 Slides.pptx
+++ b/Class 4 Slides.pptx
@@ -1718,7 +1718,7 @@
         </p:nvSpPr>
         <p:spPr>
           <a:xfrm>
-            <a:off x="381300" y="685800"/>
+            <a:off x="381000" y="685800"/>
             <a:ext cx="6096000" cy="3429000"/>
           </a:xfrm>
           <a:custGeom>
@@ -11022,9 +11022,21 @@
                   <a:cs typeface="Roboto"/>
                   <a:sym typeface="Roboto"/>
                 </a:rPr>
-                <a:t>Initial Features</a:t>
+                <a:t>Wireframes &amp; Initial </a:t>
               </a:r>
-              <a:endParaRPr sz="1800">
+              <a:r>
+                <a:rPr lang="en" sz="1800" dirty="0">
+                  <a:solidFill>
+                    <a:srgbClr val="FFFFFF"/>
+                  </a:solidFill>
+                  <a:latin typeface="Roboto"/>
+                  <a:ea typeface="Roboto"/>
+                  <a:cs typeface="Roboto"/>
+                  <a:sym typeface="Roboto"/>
+                </a:rPr>
+                <a:t>Features</a:t>
+              </a:r>
+              <a:endParaRPr sz="1800" dirty="0">
                 <a:solidFill>
                   <a:srgbClr val="FFFFFF"/>
                 </a:solidFill>

</xml_diff>

<commit_message>
Minor update to class 4 again
</commit_message>
<xml_diff>
--- a/Class 4 Slides.pptx
+++ b/Class 4 Slides.pptx
@@ -1510,7 +1510,7 @@
         </p:nvSpPr>
         <p:spPr>
           <a:xfrm>
-            <a:off x="381300" y="685800"/>
+            <a:off x="381000" y="685800"/>
             <a:ext cx="6096000" cy="3429000"/>
           </a:xfrm>
           <a:custGeom>
@@ -1614,7 +1614,7 @@
         </p:nvSpPr>
         <p:spPr>
           <a:xfrm>
-            <a:off x="381300" y="685800"/>
+            <a:off x="381000" y="685800"/>
             <a:ext cx="6096000" cy="3429000"/>
           </a:xfrm>
           <a:custGeom>
@@ -9858,10 +9858,10 @@
               <a:buNone/>
             </a:pPr>
             <a:r>
-              <a:rPr lang="en" sz="1900"/>
+              <a:rPr lang="en" sz="1900" dirty="0"/>
               <a:t>Tonight’s Objectives:</a:t>
             </a:r>
-            <a:endParaRPr sz="1900"/>
+            <a:endParaRPr sz="1900" dirty="0"/>
           </a:p>
           <a:p>
             <a:pPr marL="457200" lvl="0" indent="-342900" algn="l" rtl="0">
@@ -9875,10 +9875,14 @@
               <a:buChar char="●"/>
             </a:pPr>
             <a:r>
-              <a:rPr lang="en"/>
-              <a:t>Know what an interviewer is looking for from a live coding session</a:t>
+              <a:rPr lang="en-US" dirty="0"/>
+              <a:t>How to do your </a:t>
             </a:r>
-            <a:endParaRPr/>
+            <a:r>
+              <a:rPr lang="en-US"/>
+              <a:t>personal branding!</a:t>
+            </a:r>
+            <a:endParaRPr dirty="0"/>
           </a:p>
           <a:p>
             <a:pPr marL="457200" lvl="0" indent="-342900" algn="l" rtl="0">
@@ -9892,44 +9896,10 @@
               <a:buChar char="●"/>
             </a:pPr>
             <a:r>
-              <a:rPr lang="en"/>
-              <a:t>Explain the steps necessary for a successful live coding session</a:t>
-            </a:r>
-            <a:endParaRPr/>
-          </a:p>
-          <a:p>
-            <a:pPr marL="457200" lvl="0" indent="-342900" algn="l" rtl="0">
-              <a:spcBef>
-                <a:spcPts val="0"/>
-              </a:spcBef>
-              <a:spcAft>
-                <a:spcPts val="0"/>
-              </a:spcAft>
-              <a:buSzPts val="1800"/>
-              <a:buChar char="●"/>
-            </a:pPr>
-            <a:r>
-              <a:rPr lang="en"/>
-              <a:t>Know where to find prompts for live coding practice</a:t>
-            </a:r>
-            <a:endParaRPr/>
-          </a:p>
-          <a:p>
-            <a:pPr marL="457200" lvl="0" indent="-342900" algn="l" rtl="0">
-              <a:spcBef>
-                <a:spcPts val="0"/>
-              </a:spcBef>
-              <a:spcAft>
-                <a:spcPts val="0"/>
-              </a:spcAft>
-              <a:buSzPts val="1800"/>
-              <a:buChar char="●"/>
-            </a:pPr>
-            <a:r>
-              <a:rPr lang="en"/>
+              <a:rPr lang="en" dirty="0"/>
               <a:t>Know how to give and receive good code review feedback</a:t>
             </a:r>
-            <a:endParaRPr/>
+            <a:endParaRPr dirty="0"/>
           </a:p>
         </p:txBody>
       </p:sp>
@@ -10036,10 +10006,22 @@
               <a:buChar char="●"/>
             </a:pPr>
             <a:r>
-              <a:rPr lang="en"/>
-              <a:t>Know what an interviewer is looking for from a live coding session</a:t>
+              <a:rPr lang="en-US" dirty="0"/>
+              <a:t>Personal Branding!</a:t>
             </a:r>
-            <a:endParaRPr/>
+          </a:p>
+          <a:p>
+            <a:pPr marL="457200" lvl="0" indent="-342900" algn="l" rtl="0">
+              <a:spcBef>
+                <a:spcPts val="0"/>
+              </a:spcBef>
+              <a:spcAft>
+                <a:spcPts val="0"/>
+              </a:spcAft>
+              <a:buSzPts val="1800"/>
+              <a:buChar char="●"/>
+            </a:pPr>
+            <a:endParaRPr dirty="0"/>
           </a:p>
           <a:p>
             <a:pPr marL="457200" lvl="0" indent="-342900" algn="l" rtl="0">
@@ -10053,44 +10035,10 @@
               <a:buChar char="●"/>
             </a:pPr>
             <a:r>
-              <a:rPr lang="en"/>
-              <a:t>Explain the steps necessary for a successful live coding session</a:t>
-            </a:r>
-            <a:endParaRPr/>
-          </a:p>
-          <a:p>
-            <a:pPr marL="457200" lvl="0" indent="-342900" algn="l" rtl="0">
-              <a:spcBef>
-                <a:spcPts val="0"/>
-              </a:spcBef>
-              <a:spcAft>
-                <a:spcPts val="0"/>
-              </a:spcAft>
-              <a:buSzPts val="1800"/>
-              <a:buChar char="●"/>
-            </a:pPr>
-            <a:r>
-              <a:rPr lang="en"/>
-              <a:t>Know where to find prompts for live coding practice</a:t>
-            </a:r>
-            <a:endParaRPr/>
-          </a:p>
-          <a:p>
-            <a:pPr marL="457200" lvl="0" indent="-342900" algn="l" rtl="0">
-              <a:spcBef>
-                <a:spcPts val="0"/>
-              </a:spcBef>
-              <a:spcAft>
-                <a:spcPts val="0"/>
-              </a:spcAft>
-              <a:buSzPts val="1800"/>
-              <a:buChar char="●"/>
-            </a:pPr>
-            <a:r>
-              <a:rPr lang="en"/>
+              <a:rPr lang="en" dirty="0"/>
               <a:t>Know how to give and receive good code review feedback</a:t>
             </a:r>
-            <a:endParaRPr/>
+            <a:endParaRPr dirty="0"/>
           </a:p>
         </p:txBody>
       </p:sp>

</xml_diff>

<commit_message>
Updates for July 2022 - STL
</commit_message>
<xml_diff>
--- a/Class 4 Slides.pptx
+++ b/Class 4 Slides.pptx
@@ -8645,8 +8645,8 @@
               <a:buNone/>
             </a:pPr>
             <a:r>
-              <a:rPr lang="en-US" dirty="0"/>
-              <a:t>8/23/2021</a:t>
+              <a:rPr lang="en-US"/>
+              <a:t>8/15/2022</a:t>
             </a:r>
             <a:endParaRPr dirty="0"/>
           </a:p>

</xml_diff>